<commit_message>
repeated the LHPS environment cultivation because I realized there were batch effects that were influencing the distributions. Now it is fixed. I plotted the results again
</commit_message>
<xml_diff>
--- a/plots/BPS_fitness/figure_3_final.pptx
+++ b/plots/BPS_fitness/figure_3_final.pptx
@@ -115,7 +115,7 @@
 <file path=ppt/revisionInfo.xml><?xml version="1.0" encoding="utf-8"?>
 <p1510:revInfo xmlns:a="http://schemas.openxmlformats.org/drawingml/2006/main" xmlns:r="http://schemas.openxmlformats.org/officeDocument/2006/relationships" xmlns:p1510="http://schemas.microsoft.com/office/powerpoint/2015/10/main">
   <p1510:revLst>
-    <p1510:client id="{7E301796-C042-A649-8515-9A181D387D07}" v="1" dt="2023-08-15T13:26:09.830"/>
+    <p1510:client id="{7E301796-C042-A649-8515-9A181D387D07}" v="11" dt="2023-08-25T12:54:41.121"/>
   </p1510:revLst>
 </p1510:revInfo>
 </file>
@@ -125,18 +125,18 @@
   <pc:docChgLst>
     <pc:chgData name="Cecilia Trivellin" userId="77962b75-de7c-4c40-bb6b-4b915835e2f5" providerId="ADAL" clId="{7E301796-C042-A649-8515-9A181D387D07}"/>
     <pc:docChg chg="modSld">
-      <pc:chgData name="Cecilia Trivellin" userId="77962b75-de7c-4c40-bb6b-4b915835e2f5" providerId="ADAL" clId="{7E301796-C042-A649-8515-9A181D387D07}" dt="2023-08-15T13:27:38.956" v="95" actId="20577"/>
+      <pc:chgData name="Cecilia Trivellin" userId="77962b75-de7c-4c40-bb6b-4b915835e2f5" providerId="ADAL" clId="{7E301796-C042-A649-8515-9A181D387D07}" dt="2023-08-25T12:59:49.241" v="124" actId="1036"/>
       <pc:docMkLst>
         <pc:docMk/>
       </pc:docMkLst>
       <pc:sldChg chg="modSp mod">
-        <pc:chgData name="Cecilia Trivellin" userId="77962b75-de7c-4c40-bb6b-4b915835e2f5" providerId="ADAL" clId="{7E301796-C042-A649-8515-9A181D387D07}" dt="2023-08-15T13:27:38.956" v="95" actId="20577"/>
+        <pc:chgData name="Cecilia Trivellin" userId="77962b75-de7c-4c40-bb6b-4b915835e2f5" providerId="ADAL" clId="{7E301796-C042-A649-8515-9A181D387D07}" dt="2023-08-25T12:59:49.241" v="124" actId="1036"/>
         <pc:sldMkLst>
           <pc:docMk/>
           <pc:sldMk cId="1624886000" sldId="256"/>
         </pc:sldMkLst>
         <pc:spChg chg="mod">
-          <ac:chgData name="Cecilia Trivellin" userId="77962b75-de7c-4c40-bb6b-4b915835e2f5" providerId="ADAL" clId="{7E301796-C042-A649-8515-9A181D387D07}" dt="2023-08-15T13:26:48.274" v="13" actId="1036"/>
+          <ac:chgData name="Cecilia Trivellin" userId="77962b75-de7c-4c40-bb6b-4b915835e2f5" providerId="ADAL" clId="{7E301796-C042-A649-8515-9A181D387D07}" dt="2023-08-25T12:59:49.241" v="124" actId="1036"/>
           <ac:spMkLst>
             <pc:docMk/>
             <pc:sldMk cId="1624886000" sldId="256"/>
@@ -144,7 +144,15 @@
           </ac:spMkLst>
         </pc:spChg>
         <pc:spChg chg="mod">
-          <ac:chgData name="Cecilia Trivellin" userId="77962b75-de7c-4c40-bb6b-4b915835e2f5" providerId="ADAL" clId="{7E301796-C042-A649-8515-9A181D387D07}" dt="2023-08-15T13:27:38.956" v="95" actId="20577"/>
+          <ac:chgData name="Cecilia Trivellin" userId="77962b75-de7c-4c40-bb6b-4b915835e2f5" providerId="ADAL" clId="{7E301796-C042-A649-8515-9A181D387D07}" dt="2023-08-25T12:59:49.241" v="124" actId="1036"/>
+          <ac:spMkLst>
+            <pc:docMk/>
+            <pc:sldMk cId="1624886000" sldId="256"/>
+            <ac:spMk id="19" creationId="{761C9B9D-5939-44D6-C1D4-8F0786A28CC4}"/>
+          </ac:spMkLst>
+        </pc:spChg>
+        <pc:spChg chg="mod">
+          <ac:chgData name="Cecilia Trivellin" userId="77962b75-de7c-4c40-bb6b-4b915835e2f5" providerId="ADAL" clId="{7E301796-C042-A649-8515-9A181D387D07}" dt="2023-08-25T12:59:40.606" v="111" actId="20577"/>
           <ac:spMkLst>
             <pc:docMk/>
             <pc:sldMk cId="1624886000" sldId="256"/>
@@ -152,7 +160,7 @@
           </ac:spMkLst>
         </pc:spChg>
         <pc:picChg chg="mod">
-          <ac:chgData name="Cecilia Trivellin" userId="77962b75-de7c-4c40-bb6b-4b915835e2f5" providerId="ADAL" clId="{7E301796-C042-A649-8515-9A181D387D07}" dt="2023-08-15T13:26:23.170" v="1" actId="14100"/>
+          <ac:chgData name="Cecilia Trivellin" userId="77962b75-de7c-4c40-bb6b-4b915835e2f5" providerId="ADAL" clId="{7E301796-C042-A649-8515-9A181D387D07}" dt="2023-08-25T12:54:41.121" v="105" actId="14826"/>
           <ac:picMkLst>
             <pc:docMk/>
             <pc:sldMk cId="1624886000" sldId="256"/>
@@ -160,7 +168,7 @@
           </ac:picMkLst>
         </pc:picChg>
         <pc:cxnChg chg="mod">
-          <ac:chgData name="Cecilia Trivellin" userId="77962b75-de7c-4c40-bb6b-4b915835e2f5" providerId="ADAL" clId="{7E301796-C042-A649-8515-9A181D387D07}" dt="2023-08-15T13:26:38.523" v="5" actId="1035"/>
+          <ac:chgData name="Cecilia Trivellin" userId="77962b75-de7c-4c40-bb6b-4b915835e2f5" providerId="ADAL" clId="{7E301796-C042-A649-8515-9A181D387D07}" dt="2023-08-25T12:59:49.241" v="124" actId="1036"/>
           <ac:cxnSpMkLst>
             <pc:docMk/>
             <pc:sldMk cId="1624886000" sldId="256"/>
@@ -304,7 +312,7 @@
           <a:p>
             <a:fld id="{BB4388B5-74DE-BA45-9FD7-F6D5BDF0B5A1}" type="datetimeFigureOut">
               <a:rPr lang="en-US" smtClean="0"/>
-              <a:t>8/15/23</a:t>
+              <a:t>8/25/23</a:t>
             </a:fld>
             <a:endParaRPr lang="en-US"/>
           </a:p>
@@ -474,7 +482,7 @@
           <a:p>
             <a:fld id="{BB4388B5-74DE-BA45-9FD7-F6D5BDF0B5A1}" type="datetimeFigureOut">
               <a:rPr lang="en-US" smtClean="0"/>
-              <a:t>8/15/23</a:t>
+              <a:t>8/25/23</a:t>
             </a:fld>
             <a:endParaRPr lang="en-US"/>
           </a:p>
@@ -654,7 +662,7 @@
           <a:p>
             <a:fld id="{BB4388B5-74DE-BA45-9FD7-F6D5BDF0B5A1}" type="datetimeFigureOut">
               <a:rPr lang="en-US" smtClean="0"/>
-              <a:t>8/15/23</a:t>
+              <a:t>8/25/23</a:t>
             </a:fld>
             <a:endParaRPr lang="en-US"/>
           </a:p>
@@ -824,7 +832,7 @@
           <a:p>
             <a:fld id="{BB4388B5-74DE-BA45-9FD7-F6D5BDF0B5A1}" type="datetimeFigureOut">
               <a:rPr lang="en-US" smtClean="0"/>
-              <a:t>8/15/23</a:t>
+              <a:t>8/25/23</a:t>
             </a:fld>
             <a:endParaRPr lang="en-US"/>
           </a:p>
@@ -1068,7 +1076,7 @@
           <a:p>
             <a:fld id="{BB4388B5-74DE-BA45-9FD7-F6D5BDF0B5A1}" type="datetimeFigureOut">
               <a:rPr lang="en-US" smtClean="0"/>
-              <a:t>8/15/23</a:t>
+              <a:t>8/25/23</a:t>
             </a:fld>
             <a:endParaRPr lang="en-US"/>
           </a:p>
@@ -1300,7 +1308,7 @@
           <a:p>
             <a:fld id="{BB4388B5-74DE-BA45-9FD7-F6D5BDF0B5A1}" type="datetimeFigureOut">
               <a:rPr lang="en-US" smtClean="0"/>
-              <a:t>8/15/23</a:t>
+              <a:t>8/25/23</a:t>
             </a:fld>
             <a:endParaRPr lang="en-US"/>
           </a:p>
@@ -1667,7 +1675,7 @@
           <a:p>
             <a:fld id="{BB4388B5-74DE-BA45-9FD7-F6D5BDF0B5A1}" type="datetimeFigureOut">
               <a:rPr lang="en-US" smtClean="0"/>
-              <a:t>8/15/23</a:t>
+              <a:t>8/25/23</a:t>
             </a:fld>
             <a:endParaRPr lang="en-US"/>
           </a:p>
@@ -1785,7 +1793,7 @@
           <a:p>
             <a:fld id="{BB4388B5-74DE-BA45-9FD7-F6D5BDF0B5A1}" type="datetimeFigureOut">
               <a:rPr lang="en-US" smtClean="0"/>
-              <a:t>8/15/23</a:t>
+              <a:t>8/25/23</a:t>
             </a:fld>
             <a:endParaRPr lang="en-US"/>
           </a:p>
@@ -1880,7 +1888,7 @@
           <a:p>
             <a:fld id="{BB4388B5-74DE-BA45-9FD7-F6D5BDF0B5A1}" type="datetimeFigureOut">
               <a:rPr lang="en-US" smtClean="0"/>
-              <a:t>8/15/23</a:t>
+              <a:t>8/25/23</a:t>
             </a:fld>
             <a:endParaRPr lang="en-US"/>
           </a:p>
@@ -2157,7 +2165,7 @@
           <a:p>
             <a:fld id="{BB4388B5-74DE-BA45-9FD7-F6D5BDF0B5A1}" type="datetimeFigureOut">
               <a:rPr lang="en-US" smtClean="0"/>
-              <a:t>8/15/23</a:t>
+              <a:t>8/25/23</a:t>
             </a:fld>
             <a:endParaRPr lang="en-US"/>
           </a:p>
@@ -2414,7 +2422,7 @@
           <a:p>
             <a:fld id="{BB4388B5-74DE-BA45-9FD7-F6D5BDF0B5A1}" type="datetimeFigureOut">
               <a:rPr lang="en-US" smtClean="0"/>
-              <a:t>8/15/23</a:t>
+              <a:t>8/25/23</a:t>
             </a:fld>
             <a:endParaRPr lang="en-US"/>
           </a:p>
@@ -2627,7 +2635,7 @@
           <a:p>
             <a:fld id="{BB4388B5-74DE-BA45-9FD7-F6D5BDF0B5A1}" type="datetimeFigureOut">
               <a:rPr lang="en-US" smtClean="0"/>
-              <a:t>8/15/23</a:t>
+              <a:t>8/25/23</a:t>
             </a:fld>
             <a:endParaRPr lang="en-US"/>
           </a:p>
@@ -3054,7 +3062,7 @@
         <p:spPr>
           <a:xfrm>
             <a:off x="618350" y="331740"/>
-            <a:ext cx="8525650" cy="5683767"/>
+            <a:ext cx="8525650" cy="5683766"/>
           </a:xfrm>
           <a:prstGeom prst="rect">
             <a:avLst/>
@@ -3423,7 +3431,7 @@
         </p:nvSpPr>
         <p:spPr>
           <a:xfrm rot="16200000">
-            <a:off x="-608023" y="1947325"/>
+            <a:off x="-608023" y="1656378"/>
             <a:ext cx="1943196" cy="307777"/>
           </a:xfrm>
           <a:prstGeom prst="rect">
@@ -3461,7 +3469,7 @@
         </p:nvSpPr>
         <p:spPr>
           <a:xfrm rot="16200000">
-            <a:off x="-734349" y="4186984"/>
+            <a:off x="-734349" y="3896037"/>
             <a:ext cx="2195848" cy="307777"/>
           </a:xfrm>
           <a:prstGeom prst="rect">
@@ -3499,7 +3507,7 @@
         </p:nvCxnSpPr>
         <p:spPr>
           <a:xfrm>
-            <a:off x="139962" y="3231409"/>
+            <a:off x="139962" y="2940462"/>
             <a:ext cx="447229" cy="0"/>
           </a:xfrm>
           <a:prstGeom prst="line">
@@ -3597,7 +3605,7 @@
                 <a:latin typeface="Arial" panose="020B0604020202020204" pitchFamily="34" charset="0"/>
                 <a:cs typeface="Arial" panose="020B0604020202020204" pitchFamily="34" charset="0"/>
               </a:rPr>
-              <a:t>PERTUBATION SPACE: Beer Fermentation</a:t>
+              <a:t>PERTUBATION SPACE: Beer Fermentation (BPS)</a:t>
             </a:r>
           </a:p>
         </p:txBody>

</xml_diff>